<commit_message>
Semana 13 - Login
</commit_message>
<xml_diff>
--- a/Semana13/Prototipos.pptx
+++ b/Semana13/Prototipos.pptx
@@ -267,7 +267,7 @@
           <a:p>
             <a:fld id="{59479DF8-B0D2-410D-BE61-5137DF0C497D}" type="datetimeFigureOut">
               <a:rPr lang="es-PE" smtClean="0"/>
-              <a:t>26/05/2022</a:t>
+              <a:t>29/06/2023</a:t>
             </a:fld>
             <a:endParaRPr lang="es-PE"/>
           </a:p>
@@ -467,7 +467,7 @@
           <a:p>
             <a:fld id="{59479DF8-B0D2-410D-BE61-5137DF0C497D}" type="datetimeFigureOut">
               <a:rPr lang="es-PE" smtClean="0"/>
-              <a:t>26/05/2022</a:t>
+              <a:t>29/06/2023</a:t>
             </a:fld>
             <a:endParaRPr lang="es-PE"/>
           </a:p>
@@ -677,7 +677,7 @@
           <a:p>
             <a:fld id="{59479DF8-B0D2-410D-BE61-5137DF0C497D}" type="datetimeFigureOut">
               <a:rPr lang="es-PE" smtClean="0"/>
-              <a:t>26/05/2022</a:t>
+              <a:t>29/06/2023</a:t>
             </a:fld>
             <a:endParaRPr lang="es-PE"/>
           </a:p>
@@ -877,7 +877,7 @@
           <a:p>
             <a:fld id="{59479DF8-B0D2-410D-BE61-5137DF0C497D}" type="datetimeFigureOut">
               <a:rPr lang="es-PE" smtClean="0"/>
-              <a:t>26/05/2022</a:t>
+              <a:t>29/06/2023</a:t>
             </a:fld>
             <a:endParaRPr lang="es-PE"/>
           </a:p>
@@ -1153,7 +1153,7 @@
           <a:p>
             <a:fld id="{59479DF8-B0D2-410D-BE61-5137DF0C497D}" type="datetimeFigureOut">
               <a:rPr lang="es-PE" smtClean="0"/>
-              <a:t>26/05/2022</a:t>
+              <a:t>29/06/2023</a:t>
             </a:fld>
             <a:endParaRPr lang="es-PE"/>
           </a:p>
@@ -1421,7 +1421,7 @@
           <a:p>
             <a:fld id="{59479DF8-B0D2-410D-BE61-5137DF0C497D}" type="datetimeFigureOut">
               <a:rPr lang="es-PE" smtClean="0"/>
-              <a:t>26/05/2022</a:t>
+              <a:t>29/06/2023</a:t>
             </a:fld>
             <a:endParaRPr lang="es-PE"/>
           </a:p>
@@ -1836,7 +1836,7 @@
           <a:p>
             <a:fld id="{59479DF8-B0D2-410D-BE61-5137DF0C497D}" type="datetimeFigureOut">
               <a:rPr lang="es-PE" smtClean="0"/>
-              <a:t>26/05/2022</a:t>
+              <a:t>29/06/2023</a:t>
             </a:fld>
             <a:endParaRPr lang="es-PE"/>
           </a:p>
@@ -1978,7 +1978,7 @@
           <a:p>
             <a:fld id="{59479DF8-B0D2-410D-BE61-5137DF0C497D}" type="datetimeFigureOut">
               <a:rPr lang="es-PE" smtClean="0"/>
-              <a:t>26/05/2022</a:t>
+              <a:t>29/06/2023</a:t>
             </a:fld>
             <a:endParaRPr lang="es-PE"/>
           </a:p>
@@ -2091,7 +2091,7 @@
           <a:p>
             <a:fld id="{59479DF8-B0D2-410D-BE61-5137DF0C497D}" type="datetimeFigureOut">
               <a:rPr lang="es-PE" smtClean="0"/>
-              <a:t>26/05/2022</a:t>
+              <a:t>29/06/2023</a:t>
             </a:fld>
             <a:endParaRPr lang="es-PE"/>
           </a:p>
@@ -2404,7 +2404,7 @@
           <a:p>
             <a:fld id="{59479DF8-B0D2-410D-BE61-5137DF0C497D}" type="datetimeFigureOut">
               <a:rPr lang="es-PE" smtClean="0"/>
-              <a:t>26/05/2022</a:t>
+              <a:t>29/06/2023</a:t>
             </a:fld>
             <a:endParaRPr lang="es-PE"/>
           </a:p>
@@ -2693,7 +2693,7 @@
           <a:p>
             <a:fld id="{59479DF8-B0D2-410D-BE61-5137DF0C497D}" type="datetimeFigureOut">
               <a:rPr lang="es-PE" smtClean="0"/>
-              <a:t>26/05/2022</a:t>
+              <a:t>29/06/2023</a:t>
             </a:fld>
             <a:endParaRPr lang="es-PE"/>
           </a:p>
@@ -2936,7 +2936,7 @@
           <a:p>
             <a:fld id="{59479DF8-B0D2-410D-BE61-5137DF0C497D}" type="datetimeFigureOut">
               <a:rPr lang="es-PE" smtClean="0"/>
-              <a:t>26/05/2022</a:t>
+              <a:t>29/06/2023</a:t>
             </a:fld>
             <a:endParaRPr lang="es-PE"/>
           </a:p>
@@ -9166,7 +9166,7 @@
         </p:nvSpPr>
         <p:spPr>
           <a:xfrm>
-            <a:off x="3177309" y="1413163"/>
+            <a:off x="2637813" y="2153827"/>
             <a:ext cx="5200073" cy="3703782"/>
           </a:xfrm>
           <a:prstGeom prst="rect">
@@ -9216,7 +9216,7 @@
         </p:nvSpPr>
         <p:spPr>
           <a:xfrm>
-            <a:off x="1902691" y="1856509"/>
+            <a:off x="1363195" y="2597173"/>
             <a:ext cx="1182255" cy="1219200"/>
           </a:xfrm>
           <a:prstGeom prst="rightArrow">
@@ -9262,7 +9262,7 @@
         </p:nvSpPr>
         <p:spPr>
           <a:xfrm>
-            <a:off x="1902691" y="3401291"/>
+            <a:off x="1363195" y="4141955"/>
             <a:ext cx="1182255" cy="1219200"/>
           </a:xfrm>
           <a:prstGeom prst="rightArrow">
@@ -9308,7 +9308,7 @@
         </p:nvSpPr>
         <p:spPr>
           <a:xfrm>
-            <a:off x="1019116" y="2281443"/>
+            <a:off x="479620" y="3022107"/>
             <a:ext cx="883575" cy="369332"/>
           </a:xfrm>
           <a:prstGeom prst="rect">
@@ -9344,7 +9344,7 @@
         </p:nvSpPr>
         <p:spPr>
           <a:xfrm>
-            <a:off x="1131165" y="3826225"/>
+            <a:off x="591669" y="4566889"/>
             <a:ext cx="659476" cy="369332"/>
           </a:xfrm>
           <a:prstGeom prst="rect">
@@ -9380,7 +9380,7 @@
         </p:nvSpPr>
         <p:spPr>
           <a:xfrm>
-            <a:off x="8469745" y="2819400"/>
+            <a:off x="7930249" y="3560064"/>
             <a:ext cx="1182255" cy="1219200"/>
           </a:xfrm>
           <a:prstGeom prst="rightArrow">
@@ -9426,8 +9426,8 @@
         </p:nvSpPr>
         <p:spPr>
           <a:xfrm>
-            <a:off x="9744363" y="3216625"/>
-            <a:ext cx="1468031" cy="369332"/>
+            <a:off x="9249017" y="4566889"/>
+            <a:ext cx="2592463" cy="1477328"/>
           </a:xfrm>
           <a:prstGeom prst="rect">
             <a:avLst/>
@@ -9435,16 +9435,119 @@
           <a:noFill/>
         </p:spPr>
         <p:txBody>
-          <a:bodyPr wrap="none" rtlCol="0">
+          <a:bodyPr wrap="square" rtlCol="0">
             <a:spAutoFit/>
           </a:bodyPr>
           <a:lstStyle/>
           <a:p>
             <a:r>
-              <a:rPr lang="es-MX" dirty="0" err="1"/>
-              <a:t>empleadoDto</a:t>
+              <a:rPr lang="es-MX" dirty="0"/>
+              <a:t>Objeto de tipo Empleado con los datos del empleado, si los datos no son correctos debe generar una excepción.</a:t>
             </a:r>
             <a:endParaRPr lang="es-PE" dirty="0"/>
+          </a:p>
+        </p:txBody>
+      </p:sp>
+      <p:sp>
+        <p:nvSpPr>
+          <p:cNvPr id="9" name="CuadroTexto 8">
+            <a:extLst>
+              <a:ext uri="{FF2B5EF4-FFF2-40B4-BE49-F238E27FC236}">
+                <a16:creationId xmlns:a16="http://schemas.microsoft.com/office/drawing/2014/main" id="{9087B71B-3AE3-6B13-2D18-E5E28AFD7BB7}"/>
+              </a:ext>
+            </a:extLst>
+          </p:cNvPr>
+          <p:cNvSpPr txBox="1"/>
+          <p:nvPr/>
+        </p:nvSpPr>
+        <p:spPr>
+          <a:xfrm>
+            <a:off x="2357766" y="564152"/>
+            <a:ext cx="7476467" cy="1015663"/>
+          </a:xfrm>
+          <a:prstGeom prst="rect">
+            <a:avLst/>
+          </a:prstGeom>
+          <a:noFill/>
+        </p:spPr>
+        <p:txBody>
+          <a:bodyPr wrap="square" rtlCol="0">
+            <a:spAutoFit/>
+          </a:bodyPr>
+          <a:lstStyle/>
+          <a:p>
+            <a:pPr algn="ctr"/>
+            <a:r>
+              <a:rPr lang="es-PE" sz="4000" b="1" dirty="0">
+                <a:solidFill>
+                  <a:srgbClr val="7030A0"/>
+                </a:solidFill>
+              </a:rPr>
+              <a:t>EN LA CAPA SERVICE</a:t>
+            </a:r>
+          </a:p>
+          <a:p>
+            <a:pPr algn="ctr"/>
+            <a:r>
+              <a:rPr lang="es-PE" sz="2000" dirty="0">
+                <a:solidFill>
+                  <a:schemeClr val="tx1">
+                    <a:lumMod val="65000"/>
+                    <a:lumOff val="35000"/>
+                  </a:schemeClr>
+                </a:solidFill>
+              </a:rPr>
+              <a:t>Se necesita un servicio para validar el usuario.</a:t>
+            </a:r>
+          </a:p>
+        </p:txBody>
+      </p:sp>
+      <p:sp>
+        <p:nvSpPr>
+          <p:cNvPr id="10" name="Cubo 9">
+            <a:extLst>
+              <a:ext uri="{FF2B5EF4-FFF2-40B4-BE49-F238E27FC236}">
+                <a16:creationId xmlns:a16="http://schemas.microsoft.com/office/drawing/2014/main" id="{E19ADD87-332D-CD35-5495-4155FC21175B}"/>
+              </a:ext>
+            </a:extLst>
+          </p:cNvPr>
+          <p:cNvSpPr/>
+          <p:nvPr/>
+        </p:nvSpPr>
+        <p:spPr>
+          <a:xfrm>
+            <a:off x="9249017" y="3712325"/>
+            <a:ext cx="1563624" cy="859259"/>
+          </a:xfrm>
+          <a:prstGeom prst="cube">
+            <a:avLst>
+              <a:gd name="adj" fmla="val 12230"/>
+            </a:avLst>
+          </a:prstGeom>
+        </p:spPr>
+        <p:style>
+          <a:lnRef idx="1">
+            <a:schemeClr val="accent3"/>
+          </a:lnRef>
+          <a:fillRef idx="2">
+            <a:schemeClr val="accent3"/>
+          </a:fillRef>
+          <a:effectRef idx="1">
+            <a:schemeClr val="accent3"/>
+          </a:effectRef>
+          <a:fontRef idx="minor">
+            <a:schemeClr val="dk1"/>
+          </a:fontRef>
+        </p:style>
+        <p:txBody>
+          <a:bodyPr rtlCol="0" anchor="ctr"/>
+          <a:lstStyle/>
+          <a:p>
+            <a:pPr algn="ctr"/>
+            <a:r>
+              <a:rPr lang="es-PE" dirty="0"/>
+              <a:t>empleado</a:t>
+            </a:r>
           </a:p>
         </p:txBody>
       </p:sp>

</xml_diff>